<commit_message>
handout for students to generate ssh key
</commit_message>
<xml_diff>
--- a/git-lecture/Stat-405-git-lecture.pptx
+++ b/git-lecture/Stat-405-git-lecture.pptx
@@ -345,7 +345,7 @@
             <a:fld id="{978C79EE-6B94-49D0-89A3-0EDDCC5054DD}" type="datetimeFigureOut">
               <a:rPr lang="en-US" smtClean="0"/>
               <a:pPr/>
-              <a:t>10/21/2009</a:t>
+              <a:t>10/22/2009</a:t>
             </a:fld>
             <a:endParaRPr lang="en-US"/>
           </a:p>
@@ -512,7 +512,7 @@
             <a:fld id="{978C79EE-6B94-49D0-89A3-0EDDCC5054DD}" type="datetimeFigureOut">
               <a:rPr lang="en-US" smtClean="0"/>
               <a:pPr/>
-              <a:t>10/21/2009</a:t>
+              <a:t>10/22/2009</a:t>
             </a:fld>
             <a:endParaRPr lang="en-US"/>
           </a:p>
@@ -689,7 +689,7 @@
             <a:fld id="{978C79EE-6B94-49D0-89A3-0EDDCC5054DD}" type="datetimeFigureOut">
               <a:rPr lang="en-US" smtClean="0"/>
               <a:pPr/>
-              <a:t>10/21/2009</a:t>
+              <a:t>10/22/2009</a:t>
             </a:fld>
             <a:endParaRPr lang="en-US"/>
           </a:p>
@@ -856,7 +856,7 @@
             <a:fld id="{978C79EE-6B94-49D0-89A3-0EDDCC5054DD}" type="datetimeFigureOut">
               <a:rPr lang="en-US" smtClean="0"/>
               <a:pPr/>
-              <a:t>10/21/2009</a:t>
+              <a:t>10/22/2009</a:t>
             </a:fld>
             <a:endParaRPr lang="en-US"/>
           </a:p>
@@ -1099,7 +1099,7 @@
             <a:fld id="{978C79EE-6B94-49D0-89A3-0EDDCC5054DD}" type="datetimeFigureOut">
               <a:rPr lang="en-US" smtClean="0"/>
               <a:pPr/>
-              <a:t>10/21/2009</a:t>
+              <a:t>10/22/2009</a:t>
             </a:fld>
             <a:endParaRPr lang="en-US"/>
           </a:p>
@@ -1384,7 +1384,7 @@
             <a:fld id="{978C79EE-6B94-49D0-89A3-0EDDCC5054DD}" type="datetimeFigureOut">
               <a:rPr lang="en-US" smtClean="0"/>
               <a:pPr/>
-              <a:t>10/21/2009</a:t>
+              <a:t>10/22/2009</a:t>
             </a:fld>
             <a:endParaRPr lang="en-US"/>
           </a:p>
@@ -1803,7 +1803,7 @@
             <a:fld id="{978C79EE-6B94-49D0-89A3-0EDDCC5054DD}" type="datetimeFigureOut">
               <a:rPr lang="en-US" smtClean="0"/>
               <a:pPr/>
-              <a:t>10/21/2009</a:t>
+              <a:t>10/22/2009</a:t>
             </a:fld>
             <a:endParaRPr lang="en-US"/>
           </a:p>
@@ -1918,7 +1918,7 @@
             <a:fld id="{978C79EE-6B94-49D0-89A3-0EDDCC5054DD}" type="datetimeFigureOut">
               <a:rPr lang="en-US" smtClean="0"/>
               <a:pPr/>
-              <a:t>10/21/2009</a:t>
+              <a:t>10/22/2009</a:t>
             </a:fld>
             <a:endParaRPr lang="en-US"/>
           </a:p>
@@ -2010,7 +2010,7 @@
             <a:fld id="{978C79EE-6B94-49D0-89A3-0EDDCC5054DD}" type="datetimeFigureOut">
               <a:rPr lang="en-US" smtClean="0"/>
               <a:pPr/>
-              <a:t>10/21/2009</a:t>
+              <a:t>10/22/2009</a:t>
             </a:fld>
             <a:endParaRPr lang="en-US"/>
           </a:p>
@@ -2284,7 +2284,7 @@
             <a:fld id="{978C79EE-6B94-49D0-89A3-0EDDCC5054DD}" type="datetimeFigureOut">
               <a:rPr lang="en-US" smtClean="0"/>
               <a:pPr/>
-              <a:t>10/21/2009</a:t>
+              <a:t>10/22/2009</a:t>
             </a:fld>
             <a:endParaRPr lang="en-US"/>
           </a:p>
@@ -2534,7 +2534,7 @@
             <a:fld id="{978C79EE-6B94-49D0-89A3-0EDDCC5054DD}" type="datetimeFigureOut">
               <a:rPr lang="en-US" smtClean="0"/>
               <a:pPr/>
-              <a:t>10/21/2009</a:t>
+              <a:t>10/22/2009</a:t>
             </a:fld>
             <a:endParaRPr lang="en-US"/>
           </a:p>
@@ -2744,7 +2744,7 @@
             <a:fld id="{978C79EE-6B94-49D0-89A3-0EDDCC5054DD}" type="datetimeFigureOut">
               <a:rPr lang="en-US" smtClean="0"/>
               <a:pPr/>
-              <a:t>10/21/2009</a:t>
+              <a:t>10/22/2009</a:t>
             </a:fld>
             <a:endParaRPr lang="en-US"/>
           </a:p>
@@ -4757,7 +4757,11 @@
             </a:r>
             <a:r>
               <a:rPr lang="en-US" dirty="0" smtClean="0"/>
-              <a:t> account at www.github.com. You will need to create a </a:t>
+              <a:t> account at www.github.com. </a:t>
+            </a:r>
+            <a:r>
+              <a:rPr lang="en-US" dirty="0" smtClean="0"/>
+              <a:t>Create a </a:t>
             </a:r>
             <a:r>
               <a:rPr lang="en-US" dirty="0" err="1" smtClean="0"/>
@@ -4765,66 +4769,20 @@
             </a:r>
             <a:r>
               <a:rPr lang="en-US" dirty="0" smtClean="0"/>
-              <a:t> key to use. Run </a:t>
-            </a:r>
-          </a:p>
-          <a:p>
-            <a:pPr marL="0">
-              <a:buNone/>
-            </a:pPr>
-            <a:r>
-              <a:rPr lang="en-US" dirty="0" err="1" smtClean="0">
-                <a:latin typeface="Cumberland AMT" pitchFamily="49" charset="0"/>
-                <a:cs typeface="Cumberland AMT" pitchFamily="49" charset="0"/>
-              </a:rPr>
-              <a:t>ssh</a:t>
-            </a:r>
-            <a:r>
-              <a:rPr lang="en-US" dirty="0" smtClean="0">
-                <a:latin typeface="Cumberland AMT" pitchFamily="49" charset="0"/>
-                <a:cs typeface="Cumberland AMT" pitchFamily="49" charset="0"/>
-              </a:rPr>
-              <a:t> git@github.com </a:t>
-            </a:r>
-          </a:p>
-          <a:p>
-            <a:pPr marL="0">
-              <a:buNone/>
-            </a:pPr>
-            <a:r>
-              <a:rPr lang="en-US" dirty="0" smtClean="0"/>
-              <a:t>at the command prompt to ensure the </a:t>
-            </a:r>
-            <a:r>
-              <a:rPr lang="en-US" dirty="0" err="1" smtClean="0"/>
-              <a:t>ssh</a:t>
-            </a:r>
-            <a:r>
-              <a:rPr lang="en-US" dirty="0" smtClean="0"/>
-              <a:t> key is working. You should get the message:</a:t>
-            </a:r>
-          </a:p>
-          <a:p>
-            <a:pPr marL="0">
-              <a:buNone/>
-            </a:pPr>
-            <a:r>
-              <a:rPr lang="en-US" dirty="0" smtClean="0"/>
-              <a:t>Hi username! You’ve successfully authenticated, but </a:t>
-            </a:r>
-            <a:r>
-              <a:rPr lang="en-US" dirty="0" err="1" smtClean="0"/>
-              <a:t>GitHub</a:t>
-            </a:r>
-            <a:r>
-              <a:rPr lang="en-US" dirty="0" smtClean="0"/>
-              <a:t> does not provide shell access</a:t>
-            </a:r>
-          </a:p>
-          <a:p>
-            <a:pPr marL="0">
-              <a:buNone/>
-            </a:pPr>
+              <a:t> key </a:t>
+            </a:r>
+            <a:r>
+              <a:rPr lang="en-US" dirty="0" smtClean="0"/>
+              <a:t>and add it to the account (</a:t>
+            </a:r>
+            <a:r>
+              <a:rPr lang="en-US" smtClean="0"/>
+              <a:t>see handout)</a:t>
+            </a:r>
+            <a:r>
+              <a:rPr lang="en-US" smtClean="0"/>
+              <a:t>. </a:t>
+            </a:r>
             <a:endParaRPr lang="en-US" dirty="0" smtClean="0"/>
           </a:p>
           <a:p>
@@ -5194,11 +5152,7 @@
             </a:pPr>
             <a:r>
               <a:rPr lang="en-US" dirty="0" smtClean="0"/>
-              <a:t>More reasons for</a:t>
-            </a:r>
-            <a:r>
-              <a:rPr lang="en-US" dirty="0" smtClean="0"/>
-              <a:t> </a:t>
+              <a:t>More reasons for </a:t>
             </a:r>
             <a:r>
               <a:rPr lang="en-US" dirty="0" err="1" smtClean="0"/>
@@ -5208,7 +5162,6 @@
               <a:rPr lang="en-US" dirty="0" smtClean="0"/>
               <a:t> </a:t>
             </a:r>
-            <a:endParaRPr lang="en-US" dirty="0" smtClean="0"/>
           </a:p>
           <a:p>
             <a:pPr marL="514350" indent="-514350">
@@ -5582,13 +5535,7 @@
               <a:rPr lang="en-US" dirty="0" smtClean="0">
                 <a:cs typeface="Cumberland AMT" pitchFamily="49" charset="0"/>
               </a:rPr>
-              <a:t>(All </a:t>
-            </a:r>
-            <a:r>
-              <a:rPr lang="en-US" dirty="0" smtClean="0">
-                <a:cs typeface="Cumberland AMT" pitchFamily="49" charset="0"/>
-              </a:rPr>
-              <a:t>one line) Your username and repository name are in the address bar of the </a:t>
+              <a:t>(All one line) Your username and repository name are in the address bar of the </a:t>
             </a:r>
             <a:r>
               <a:rPr lang="en-US" dirty="0" err="1" smtClean="0">
@@ -5808,13 +5755,8 @@
             </a:pPr>
             <a:r>
               <a:rPr lang="en-US" dirty="0" smtClean="0"/>
-              <a:t>Create a new folder on your computer named </a:t>
-            </a:r>
-            <a:r>
-              <a:rPr lang="en-US" dirty="0" smtClean="0"/>
-              <a:t>“name-project”.</a:t>
-            </a:r>
-            <a:endParaRPr lang="en-US" dirty="0" smtClean="0"/>
+              <a:t>Create a new folder on your computer named “name-project”.</a:t>
+            </a:r>
           </a:p>
           <a:p>
             <a:pPr marL="0">
@@ -6184,11 +6126,7 @@
             </a:r>
             <a:r>
               <a:rPr lang="en-US" dirty="0" smtClean="0"/>
-              <a:t> commit –</a:t>
-            </a:r>
-            <a:r>
-              <a:rPr lang="en-US" dirty="0" smtClean="0"/>
-              <a:t>m""</a:t>
+              <a:t> commit –m""</a:t>
             </a:r>
             <a:endParaRPr lang="en-US" dirty="0"/>
           </a:p>
@@ -6303,15 +6241,7 @@
             </a:r>
             <a:r>
               <a:rPr lang="en-US" dirty="0" smtClean="0"/>
-              <a:t> commit –</a:t>
-            </a:r>
-            <a:r>
-              <a:rPr lang="en-US" dirty="0" smtClean="0"/>
-              <a:t>m</a:t>
-            </a:r>
-            <a:r>
-              <a:rPr lang="en-US" dirty="0" smtClean="0"/>
-              <a:t>""</a:t>
+              <a:t> commit –m""</a:t>
             </a:r>
             <a:endParaRPr lang="en-US" dirty="0"/>
           </a:p>
@@ -6372,26 +6302,8 @@
                 <a:latin typeface="Cumberland AMT" pitchFamily="49" charset="0"/>
                 <a:cs typeface="Cumberland AMT" pitchFamily="49" charset="0"/>
               </a:rPr>
-              <a:t> </a:t>
-            </a:r>
-            <a:r>
-              <a:rPr lang="en-US" dirty="0" smtClean="0">
-                <a:latin typeface="Cumberland AMT" pitchFamily="49" charset="0"/>
-                <a:cs typeface="Cumberland AMT" pitchFamily="49" charset="0"/>
-              </a:rPr>
-              <a:t>message </a:t>
-            </a:r>
-            <a:r>
-              <a:rPr lang="en-US" dirty="0" smtClean="0">
-                <a:latin typeface="Cumberland AMT" pitchFamily="49" charset="0"/>
-                <a:cs typeface="Cumberland AMT" pitchFamily="49" charset="0"/>
-              </a:rPr>
-              <a:t>here"</a:t>
-            </a:r>
-            <a:endParaRPr lang="en-US" dirty="0" smtClean="0">
-              <a:latin typeface="Cumberland AMT" pitchFamily="49" charset="0"/>
-              <a:cs typeface="Cumberland AMT" pitchFamily="49" charset="0"/>
-            </a:endParaRPr>
+              <a:t> message here"</a:t>
+            </a:r>
           </a:p>
           <a:p>
             <a:pPr marL="0">
@@ -6854,22 +6766,11 @@
                 <a:latin typeface="Cumberland AMT" pitchFamily="49" charset="0"/>
                 <a:cs typeface="Cumberland AMT" pitchFamily="49" charset="0"/>
               </a:rPr>
-              <a:t> commit –</a:t>
-            </a:r>
-            <a:r>
-              <a:rPr lang="en-US" dirty="0" smtClean="0">
-                <a:latin typeface="Cumberland AMT" pitchFamily="49" charset="0"/>
-                <a:cs typeface="Cumberland AMT" pitchFamily="49" charset="0"/>
-              </a:rPr>
-              <a:t>m""</a:t>
-            </a:r>
-            <a:r>
-              <a:rPr lang="en-US" dirty="0" smtClean="0"/>
-              <a:t>, </a:t>
-            </a:r>
-            <a:r>
-              <a:rPr lang="en-US" dirty="0" smtClean="0"/>
-              <a:t>and </a:t>
+              <a:t> commit –m""</a:t>
+            </a:r>
+            <a:r>
+              <a:rPr lang="en-US" dirty="0" smtClean="0"/>
+              <a:t>, and </a:t>
             </a:r>
             <a:r>
               <a:rPr lang="en-US" dirty="0" err="1" smtClean="0">
@@ -7760,20 +7661,12 @@
                 <a:latin typeface="Cumberland AMT" pitchFamily="49" charset="0"/>
                 <a:cs typeface="Cumberland AMT" pitchFamily="49" charset="0"/>
               </a:rPr>
-              <a:t> commit –</a:t>
-            </a:r>
-            <a:r>
-              <a:rPr lang="en-US" dirty="0" smtClean="0">
-                <a:latin typeface="Cumberland AMT" pitchFamily="49" charset="0"/>
-                <a:cs typeface="Cumberland AMT" pitchFamily="49" charset="0"/>
-              </a:rPr>
-              <a:t>m""</a:t>
+              <a:t> commit –m""</a:t>
             </a:r>
             <a:r>
               <a:rPr lang="en-US" dirty="0" smtClean="0"/>
               <a:t>)</a:t>
             </a:r>
-            <a:endParaRPr lang="en-US" dirty="0" smtClean="0"/>
           </a:p>
           <a:p>
             <a:pPr marL="514350" indent="-514350">
@@ -8996,13 +8889,8 @@
             </a:pPr>
             <a:r>
               <a:rPr lang="en-US" dirty="0" smtClean="0"/>
-              <a:t>Sometimes the change you wish to make involves deleting a file. You can </a:t>
-            </a:r>
-            <a:r>
-              <a:rPr lang="en-US" dirty="0" smtClean="0"/>
-              <a:t>delete a file with</a:t>
-            </a:r>
-            <a:endParaRPr lang="en-US" dirty="0" smtClean="0"/>
+              <a:t>Sometimes the change you wish to make involves deleting a file. You can delete a file with</a:t>
+            </a:r>
           </a:p>
           <a:p>
             <a:pPr marL="0">
@@ -9121,40 +9009,47 @@
                 <a:latin typeface="Cumberland AMT" pitchFamily="49" charset="0"/>
                 <a:cs typeface="Cumberland AMT" pitchFamily="49" charset="0"/>
               </a:rPr>
-              <a:t>g</a:t>
+              <a:t>git</a:t>
+            </a:r>
+            <a:r>
+              <a:rPr lang="en-US" dirty="0" smtClean="0">
+                <a:latin typeface="Cumberland AMT" pitchFamily="49" charset="0"/>
+                <a:cs typeface="Cumberland AMT" pitchFamily="49" charset="0"/>
+              </a:rPr>
+              <a:t> add -u</a:t>
+            </a:r>
+          </a:p>
+          <a:p>
+            <a:pPr>
+              <a:buNone/>
+            </a:pPr>
+            <a:endParaRPr lang="en-US" dirty="0" smtClean="0"/>
+          </a:p>
+          <a:p>
+            <a:r>
+              <a:rPr lang="en-US" dirty="0" smtClean="0"/>
+              <a:t>In general its easier to use </a:t>
             </a:r>
             <a:r>
               <a:rPr lang="en-US" dirty="0" err="1" smtClean="0">
                 <a:latin typeface="Cumberland AMT" pitchFamily="49" charset="0"/>
                 <a:cs typeface="Cumberland AMT" pitchFamily="49" charset="0"/>
               </a:rPr>
-              <a:t>it</a:t>
+              <a:t>git</a:t>
             </a:r>
             <a:r>
               <a:rPr lang="en-US" dirty="0" smtClean="0">
                 <a:latin typeface="Cumberland AMT" pitchFamily="49" charset="0"/>
                 <a:cs typeface="Cumberland AMT" pitchFamily="49" charset="0"/>
               </a:rPr>
-              <a:t> add -u</a:t>
-            </a:r>
-          </a:p>
-          <a:p>
-            <a:pPr>
-              <a:buNone/>
-            </a:pPr>
-            <a:endParaRPr lang="en-US" dirty="0" smtClean="0"/>
-          </a:p>
-          <a:p>
-            <a:r>
-              <a:rPr lang="en-US" dirty="0" smtClean="0"/>
-              <a:t>In general its easier to use </a:t>
+              <a:t> </a:t>
             </a:r>
             <a:r>
               <a:rPr lang="en-US" dirty="0" err="1" smtClean="0">
                 <a:latin typeface="Cumberland AMT" pitchFamily="49" charset="0"/>
                 <a:cs typeface="Cumberland AMT" pitchFamily="49" charset="0"/>
               </a:rPr>
-              <a:t>git</a:t>
+              <a:t>rm</a:t>
             </a:r>
             <a:r>
               <a:rPr lang="en-US" dirty="0" smtClean="0">
@@ -9164,26 +9059,8 @@
               <a:t> </a:t>
             </a:r>
             <a:r>
-              <a:rPr lang="en-US" dirty="0" err="1" smtClean="0">
-                <a:latin typeface="Cumberland AMT" pitchFamily="49" charset="0"/>
-                <a:cs typeface="Cumberland AMT" pitchFamily="49" charset="0"/>
-              </a:rPr>
-              <a:t>rm</a:t>
-            </a:r>
-            <a:r>
-              <a:rPr lang="en-US" dirty="0" smtClean="0">
-                <a:latin typeface="Cumberland AMT" pitchFamily="49" charset="0"/>
-                <a:cs typeface="Cumberland AMT" pitchFamily="49" charset="0"/>
-              </a:rPr>
-              <a:t> </a:t>
-            </a:r>
-            <a:r>
-              <a:rPr lang="en-US" dirty="0" smtClean="0"/>
-              <a:t>to delete </a:t>
-            </a:r>
-            <a:r>
-              <a:rPr lang="en-US" dirty="0" smtClean="0"/>
-              <a:t>files that </a:t>
+              <a:rPr lang="en-US" dirty="0" smtClean="0"/>
+              <a:t>to delete files that </a:t>
             </a:r>
             <a:r>
               <a:rPr lang="en-US" dirty="0" err="1" smtClean="0"/>
@@ -9348,14 +9225,7 @@
                 <a:latin typeface="Cumberland AMT" pitchFamily="49" charset="0"/>
                 <a:cs typeface="Cumberland AMT" pitchFamily="49" charset="0"/>
               </a:rPr>
-              <a:t> </a:t>
-            </a:r>
-            <a:r>
-              <a:rPr lang="en-US" dirty="0" smtClean="0">
-                <a:latin typeface="Cumberland AMT" pitchFamily="49" charset="0"/>
-                <a:cs typeface="Cumberland AMT" pitchFamily="49" charset="0"/>
-              </a:rPr>
-              <a:t>commit-m"" </a:t>
+              <a:t> commit-m"" </a:t>
             </a:r>
             <a:r>
               <a:rPr lang="en-US" dirty="0" smtClean="0"/>
@@ -10135,66 +10005,41 @@
                 <a:latin typeface="Cumberland AMT" pitchFamily="49" charset="0"/>
                 <a:cs typeface="Cumberland AMT" pitchFamily="49" charset="0"/>
               </a:rPr>
-              <a:t> reset </a:t>
+              <a:t> reset --hard</a:t>
+            </a:r>
+          </a:p>
+          <a:p>
+            <a:pPr>
+              <a:buNone/>
+            </a:pPr>
+            <a:endParaRPr lang="en-US" dirty="0" smtClean="0"/>
+          </a:p>
+          <a:p>
+            <a:pPr>
+              <a:buNone/>
+            </a:pPr>
+            <a:r>
+              <a:rPr lang="en-US" dirty="0" smtClean="0"/>
+              <a:t>To go back exactly two commits, run</a:t>
+            </a:r>
+          </a:p>
+          <a:p>
+            <a:pPr>
+              <a:buNone/>
+            </a:pPr>
+            <a:r>
+              <a:rPr lang="en-US" dirty="0" err="1" smtClean="0">
+                <a:latin typeface="Cumberland AMT" pitchFamily="49" charset="0"/>
+                <a:cs typeface="Cumberland AMT" pitchFamily="49" charset="0"/>
+              </a:rPr>
+              <a:t>git</a:t>
             </a:r>
             <a:r>
               <a:rPr lang="en-US" dirty="0" smtClean="0">
                 <a:latin typeface="Cumberland AMT" pitchFamily="49" charset="0"/>
                 <a:cs typeface="Cumberland AMT" pitchFamily="49" charset="0"/>
               </a:rPr>
-              <a:t>--hard</a:t>
-            </a:r>
-            <a:endParaRPr lang="en-US" dirty="0" smtClean="0">
-              <a:latin typeface="Cumberland AMT" pitchFamily="49" charset="0"/>
-              <a:cs typeface="Cumberland AMT" pitchFamily="49" charset="0"/>
-            </a:endParaRPr>
-          </a:p>
-          <a:p>
-            <a:pPr>
-              <a:buNone/>
-            </a:pPr>
-            <a:endParaRPr lang="en-US" dirty="0" smtClean="0"/>
-          </a:p>
-          <a:p>
-            <a:pPr>
-              <a:buNone/>
-            </a:pPr>
-            <a:r>
-              <a:rPr lang="en-US" dirty="0" smtClean="0"/>
-              <a:t>To go back exactly two commits, run</a:t>
-            </a:r>
-          </a:p>
-          <a:p>
-            <a:pPr>
-              <a:buNone/>
-            </a:pPr>
-            <a:r>
-              <a:rPr lang="en-US" dirty="0" err="1" smtClean="0">
-                <a:latin typeface="Cumberland AMT" pitchFamily="49" charset="0"/>
-                <a:cs typeface="Cumberland AMT" pitchFamily="49" charset="0"/>
-              </a:rPr>
-              <a:t>git</a:t>
-            </a:r>
-            <a:r>
-              <a:rPr lang="en-US" dirty="0" smtClean="0">
-                <a:latin typeface="Cumberland AMT" pitchFamily="49" charset="0"/>
-                <a:cs typeface="Cumberland AMT" pitchFamily="49" charset="0"/>
-              </a:rPr>
-              <a:t> reset </a:t>
-            </a:r>
-            <a:r>
-              <a:rPr lang="en-US" dirty="0" smtClean="0">
-                <a:latin typeface="Cumberland AMT" pitchFamily="49" charset="0"/>
-                <a:cs typeface="Cumberland AMT" pitchFamily="49" charset="0"/>
-              </a:rPr>
-              <a:t>--hard </a:t>
-            </a:r>
-            <a:r>
-              <a:rPr lang="en-US" dirty="0" smtClean="0">
-                <a:latin typeface="Cumberland AMT" pitchFamily="49" charset="0"/>
-                <a:cs typeface="Cumberland AMT" pitchFamily="49" charset="0"/>
-              </a:rPr>
-              <a:t>HEAD^</a:t>
+              <a:t> reset --hard HEAD^</a:t>
             </a:r>
           </a:p>
           <a:p>
@@ -10236,21 +10081,7 @@
                 <a:latin typeface="Cumberland AMT" pitchFamily="49" charset="0"/>
                 <a:cs typeface="Cumberland AMT" pitchFamily="49" charset="0"/>
               </a:rPr>
-              <a:t> reset </a:t>
-            </a:r>
-            <a:r>
-              <a:rPr lang="en-US" dirty="0" smtClean="0">
-                <a:latin typeface="Cumberland AMT" pitchFamily="49" charset="0"/>
-                <a:cs typeface="Cumberland AMT" pitchFamily="49" charset="0"/>
-              </a:rPr>
-              <a:t>--hard </a:t>
-            </a:r>
-            <a:r>
-              <a:rPr lang="en-US" dirty="0" smtClean="0">
-                <a:latin typeface="Cumberland AMT" pitchFamily="49" charset="0"/>
-                <a:cs typeface="Cumberland AMT" pitchFamily="49" charset="0"/>
-              </a:rPr>
-              <a:t>&lt;commit name&gt;</a:t>
+              <a:t> reset --hard &lt;commit name&gt;</a:t>
             </a:r>
           </a:p>
           <a:p>
@@ -10259,15 +10090,7 @@
             </a:pPr>
             <a:r>
               <a:rPr lang="en-US" dirty="0" smtClean="0"/>
-              <a:t>*Please ask Professor Wickham or </a:t>
-            </a:r>
-            <a:r>
-              <a:rPr lang="en-US" dirty="0" smtClean="0"/>
-              <a:t>me </a:t>
-            </a:r>
-            <a:r>
-              <a:rPr lang="en-US" dirty="0" smtClean="0"/>
-              <a:t>before doing this last one. There’s probably a better way to achieve your goals.</a:t>
+              <a:t>*Please ask Professor Wickham or me before doing this last one. There’s probably a better way to achieve your goals.</a:t>
             </a:r>
             <a:endParaRPr lang="en-US" dirty="0"/>
           </a:p>
@@ -10597,14 +10420,7 @@
                 <a:latin typeface="Cumberland AMT" pitchFamily="49" charset="0"/>
                 <a:cs typeface="Cumberland AMT" pitchFamily="49" charset="0"/>
               </a:rPr>
-              <a:t>l</a:t>
-            </a:r>
-            <a:r>
-              <a:rPr lang="en-US" dirty="0" err="1" smtClean="0">
-                <a:latin typeface="Cumberland AMT" pitchFamily="49" charset="0"/>
-                <a:cs typeface="Cumberland AMT" pitchFamily="49" charset="0"/>
-              </a:rPr>
-              <a:t>s</a:t>
+              <a:t>ls</a:t>
             </a:r>
             <a:r>
               <a:rPr lang="en-US" dirty="0" smtClean="0">
@@ -10797,11 +10613,7 @@
             </a:br>
             <a:r>
               <a:rPr lang="en-US" sz="4000" dirty="0" smtClean="0"/>
-              <a:t>*.</a:t>
-            </a:r>
-            <a:r>
-              <a:rPr lang="en-US" sz="4000" dirty="0" smtClean="0"/>
-              <a:t>mtc1</a:t>
+              <a:t>*.mtc1</a:t>
             </a:r>
             <a:endParaRPr lang="en-US" dirty="0"/>
           </a:p>
@@ -11118,15 +10930,7 @@
             </a:pPr>
             <a:r>
               <a:rPr lang="en-US" dirty="0" smtClean="0"/>
-              <a:t>Work together to fill in the git-template.tex latex template. One person fill out the template, one person make the graph. </a:t>
-            </a:r>
-            <a:r>
-              <a:rPr lang="en-US" dirty="0" smtClean="0"/>
-              <a:t>Create a </a:t>
-            </a:r>
-            <a:r>
-              <a:rPr lang="en-US" dirty="0" smtClean="0"/>
-              <a:t>.</a:t>
+              <a:t>Work together to fill in the git-template.tex latex template. One person fill out the template, one person make the graph. Create a .</a:t>
             </a:r>
             <a:r>
               <a:rPr lang="en-US" dirty="0" err="1" smtClean="0"/>
@@ -11134,11 +10938,7 @@
             </a:r>
             <a:r>
               <a:rPr lang="en-US" dirty="0" smtClean="0"/>
-              <a:t> file before you start filling your repository with excess latex files. </a:t>
-            </a:r>
-            <a:r>
-              <a:rPr lang="en-US" dirty="0" smtClean="0"/>
-              <a:t>Use </a:t>
+              <a:t> file before you start filling your repository with excess latex files. Use </a:t>
             </a:r>
             <a:r>
               <a:rPr lang="en-US" dirty="0" err="1" smtClean="0"/>
@@ -11485,15 +11285,7 @@
             </a:pPr>
             <a:r>
               <a:rPr lang="en-US" dirty="0" smtClean="0"/>
-              <a:t>   http</a:t>
-            </a:r>
-            <a:r>
-              <a:rPr lang="en-US" dirty="0" smtClean="0"/>
-              <a:t>://</a:t>
-            </a:r>
-            <a:r>
-              <a:rPr lang="en-US" dirty="0" smtClean="0"/>
-              <a:t>github.com/guides/home</a:t>
+              <a:t>   http://github.com/guides/home</a:t>
             </a:r>
           </a:p>
           <a:p>
@@ -11521,15 +11313,7 @@
             </a:pPr>
             <a:r>
               <a:rPr lang="en-US" dirty="0" smtClean="0"/>
-              <a:t>  http</a:t>
-            </a:r>
-            <a:r>
-              <a:rPr lang="en-US" dirty="0" smtClean="0"/>
-              <a:t>://</a:t>
-            </a:r>
-            <a:r>
-              <a:rPr lang="en-US" dirty="0" smtClean="0"/>
-              <a:t>zrusin.blogspot.com/2007/09/git-cheat-sheet.html</a:t>
+              <a:t>  http://zrusin.blogspot.com/2007/09/git-cheat-sheet.html</a:t>
             </a:r>
           </a:p>
           <a:p>
@@ -11550,7 +11334,6 @@
               <a:rPr lang="en-US" dirty="0" smtClean="0"/>
               <a:t> User's manual</a:t>
             </a:r>
-            <a:endParaRPr lang="en-US" dirty="0" smtClean="0"/>
           </a:p>
           <a:p>
             <a:pPr>
@@ -11558,11 +11341,7 @@
             </a:pPr>
             <a:r>
               <a:rPr lang="en-US" dirty="0" smtClean="0"/>
-              <a:t> http</a:t>
-            </a:r>
-            <a:r>
-              <a:rPr lang="en-US" dirty="0" smtClean="0"/>
-              <a:t>://www.kernel.org/pub/software/scm/git/docs/user-manual.html</a:t>
+              <a:t> http://www.kernel.org/pub/software/scm/git/docs/user-manual.html</a:t>
             </a:r>
             <a:endParaRPr lang="en-US" dirty="0"/>
           </a:p>

</xml_diff>